<commit_message>
report updated with the effective area evaluation
</commit_message>
<xml_diff>
--- a/reports/2024-01-10/cusp_geant4_status_2024-01-10.pptx
+++ b/reports/2024-01-10/cusp_geant4_status_2024-01-10.pptx
@@ -7,6 +7,8 @@
   <p:sldIdLst>
     <p:sldId id="256" r:id="rId2"/>
     <p:sldId id="257" r:id="rId3"/>
+    <p:sldId id="258" r:id="rId4"/>
+    <p:sldId id="259" r:id="rId5"/>
   </p:sldIdLst>
   <p:sldSz cx="12192000" cy="6858000"/>
   <p:notesSz cx="6858000" cy="9144000"/>
@@ -105,6 +107,11 @@
       </a:defRPr>
     </a:lvl9pPr>
   </p:defaultTextStyle>
+  <p:extLst>
+    <p:ext uri="{EFAFB233-063F-42B5-8137-9DF3F51BA10A}">
+      <p15:sldGuideLst xmlns:p15="http://schemas.microsoft.com/office/powerpoint/2012/main"/>
+    </p:ext>
+  </p:extLst>
 </p:presentation>
 </file>
 
@@ -257,7 +264,7 @@
           <a:p>
             <a:fld id="{ACD76B8E-B4D7-F447-B687-2804AAF21361}" type="datetimeFigureOut">
               <a:rPr lang="en-US" smtClean="0"/>
-              <a:t>1/9/24</a:t>
+              <a:t>1/11/24</a:t>
             </a:fld>
             <a:endParaRPr lang="en-US"/>
           </a:p>
@@ -457,7 +464,7 @@
           <a:p>
             <a:fld id="{ACD76B8E-B4D7-F447-B687-2804AAF21361}" type="datetimeFigureOut">
               <a:rPr lang="en-US" smtClean="0"/>
-              <a:t>1/9/24</a:t>
+              <a:t>1/11/24</a:t>
             </a:fld>
             <a:endParaRPr lang="en-US"/>
           </a:p>
@@ -667,7 +674,7 @@
           <a:p>
             <a:fld id="{ACD76B8E-B4D7-F447-B687-2804AAF21361}" type="datetimeFigureOut">
               <a:rPr lang="en-US" smtClean="0"/>
-              <a:t>1/9/24</a:t>
+              <a:t>1/11/24</a:t>
             </a:fld>
             <a:endParaRPr lang="en-US"/>
           </a:p>
@@ -867,7 +874,7 @@
           <a:p>
             <a:fld id="{ACD76B8E-B4D7-F447-B687-2804AAF21361}" type="datetimeFigureOut">
               <a:rPr lang="en-US" smtClean="0"/>
-              <a:t>1/9/24</a:t>
+              <a:t>1/11/24</a:t>
             </a:fld>
             <a:endParaRPr lang="en-US"/>
           </a:p>
@@ -1143,7 +1150,7 @@
           <a:p>
             <a:fld id="{ACD76B8E-B4D7-F447-B687-2804AAF21361}" type="datetimeFigureOut">
               <a:rPr lang="en-US" smtClean="0"/>
-              <a:t>1/9/24</a:t>
+              <a:t>1/11/24</a:t>
             </a:fld>
             <a:endParaRPr lang="en-US"/>
           </a:p>
@@ -1411,7 +1418,7 @@
           <a:p>
             <a:fld id="{ACD76B8E-B4D7-F447-B687-2804AAF21361}" type="datetimeFigureOut">
               <a:rPr lang="en-US" smtClean="0"/>
-              <a:t>1/9/24</a:t>
+              <a:t>1/11/24</a:t>
             </a:fld>
             <a:endParaRPr lang="en-US"/>
           </a:p>
@@ -1826,7 +1833,7 @@
           <a:p>
             <a:fld id="{ACD76B8E-B4D7-F447-B687-2804AAF21361}" type="datetimeFigureOut">
               <a:rPr lang="en-US" smtClean="0"/>
-              <a:t>1/9/24</a:t>
+              <a:t>1/11/24</a:t>
             </a:fld>
             <a:endParaRPr lang="en-US"/>
           </a:p>
@@ -1968,7 +1975,7 @@
           <a:p>
             <a:fld id="{ACD76B8E-B4D7-F447-B687-2804AAF21361}" type="datetimeFigureOut">
               <a:rPr lang="en-US" smtClean="0"/>
-              <a:t>1/9/24</a:t>
+              <a:t>1/11/24</a:t>
             </a:fld>
             <a:endParaRPr lang="en-US"/>
           </a:p>
@@ -2081,7 +2088,7 @@
           <a:p>
             <a:fld id="{ACD76B8E-B4D7-F447-B687-2804AAF21361}" type="datetimeFigureOut">
               <a:rPr lang="en-US" smtClean="0"/>
-              <a:t>1/9/24</a:t>
+              <a:t>1/11/24</a:t>
             </a:fld>
             <a:endParaRPr lang="en-US"/>
           </a:p>
@@ -2394,7 +2401,7 @@
           <a:p>
             <a:fld id="{ACD76B8E-B4D7-F447-B687-2804AAF21361}" type="datetimeFigureOut">
               <a:rPr lang="en-US" smtClean="0"/>
-              <a:t>1/9/24</a:t>
+              <a:t>1/11/24</a:t>
             </a:fld>
             <a:endParaRPr lang="en-US"/>
           </a:p>
@@ -2683,7 +2690,7 @@
           <a:p>
             <a:fld id="{ACD76B8E-B4D7-F447-B687-2804AAF21361}" type="datetimeFigureOut">
               <a:rPr lang="en-US" smtClean="0"/>
-              <a:t>1/9/24</a:t>
+              <a:t>1/11/24</a:t>
             </a:fld>
             <a:endParaRPr lang="en-US"/>
           </a:p>
@@ -2926,7 +2933,7 @@
           <a:p>
             <a:fld id="{ACD76B8E-B4D7-F447-B687-2804AAF21361}" type="datetimeFigureOut">
               <a:rPr lang="en-US" smtClean="0"/>
-              <a:t>1/9/24</a:t>
+              <a:t>1/11/24</a:t>
             </a:fld>
             <a:endParaRPr lang="en-US"/>
           </a:p>
@@ -3631,6 +3638,358 @@
 </p:sld>
 </file>
 
+<file path=ppt/slides/slide3.xml><?xml version="1.0" encoding="utf-8"?>
+<p:sld xmlns:a="http://schemas.openxmlformats.org/drawingml/2006/main" xmlns:r="http://schemas.openxmlformats.org/officeDocument/2006/relationships" xmlns:p="http://schemas.openxmlformats.org/presentationml/2006/main">
+  <p:cSld>
+    <p:spTree>
+      <p:nvGrpSpPr>
+        <p:cNvPr id="1" name=""/>
+        <p:cNvGrpSpPr/>
+        <p:nvPr/>
+      </p:nvGrpSpPr>
+      <p:grpSpPr>
+        <a:xfrm>
+          <a:off x="0" y="0"/>
+          <a:ext cx="0" cy="0"/>
+          <a:chOff x="0" y="0"/>
+          <a:chExt cx="0" cy="0"/>
+        </a:xfrm>
+      </p:grpSpPr>
+      <p:sp>
+        <p:nvSpPr>
+          <p:cNvPr id="2" name="CasellaDiTesto 1">
+            <a:extLst>
+              <a:ext uri="{FF2B5EF4-FFF2-40B4-BE49-F238E27FC236}">
+                <a16:creationId xmlns:a16="http://schemas.microsoft.com/office/drawing/2014/main" id="{DD9C83FF-9E85-E1D4-94AC-8554F9B66E98}"/>
+              </a:ext>
+            </a:extLst>
+          </p:cNvPr>
+          <p:cNvSpPr txBox="1"/>
+          <p:nvPr/>
+        </p:nvSpPr>
+        <p:spPr>
+          <a:xfrm>
+            <a:off x="1461052" y="844826"/>
+            <a:ext cx="7333226" cy="1015663"/>
+          </a:xfrm>
+          <a:prstGeom prst="rect">
+            <a:avLst/>
+          </a:prstGeom>
+          <a:noFill/>
+        </p:spPr>
+        <p:txBody>
+          <a:bodyPr wrap="none" rtlCol="0">
+            <a:spAutoFit/>
+          </a:bodyPr>
+          <a:lstStyle/>
+          <a:p>
+            <a:r>
+              <a:rPr lang="en-US" sz="2400" b="1" dirty="0"/>
+              <a:t>How the effective area is evaluated</a:t>
+            </a:r>
+          </a:p>
+          <a:p>
+            <a:endParaRPr lang="en-US" dirty="0"/>
+          </a:p>
+          <a:p>
+            <a:r>
+              <a:rPr lang="en-US" dirty="0"/>
+              <a:t>By definition the effective area is an ideal detector area with efficiency one:</a:t>
+            </a:r>
+          </a:p>
+        </p:txBody>
+      </p:sp>
+      <p:pic>
+        <p:nvPicPr>
+          <p:cNvPr id="4" name="Immagine 3">
+            <a:extLst>
+              <a:ext uri="{FF2B5EF4-FFF2-40B4-BE49-F238E27FC236}">
+                <a16:creationId xmlns:a16="http://schemas.microsoft.com/office/drawing/2014/main" id="{4F675787-E602-25A7-96D1-9C6B3AB4ED5E}"/>
+              </a:ext>
+            </a:extLst>
+          </p:cNvPr>
+          <p:cNvPicPr>
+            <a:picLocks noChangeAspect="1"/>
+          </p:cNvPicPr>
+          <p:nvPr/>
+        </p:nvPicPr>
+        <p:blipFill>
+          <a:blip r:embed="rId2"/>
+          <a:stretch>
+            <a:fillRect/>
+          </a:stretch>
+        </p:blipFill>
+        <p:spPr>
+          <a:xfrm>
+            <a:off x="2616200" y="2049849"/>
+            <a:ext cx="3479800" cy="558800"/>
+          </a:xfrm>
+          <a:prstGeom prst="rect">
+            <a:avLst/>
+          </a:prstGeom>
+        </p:spPr>
+      </p:pic>
+      <p:sp>
+        <p:nvSpPr>
+          <p:cNvPr id="5" name="CasellaDiTesto 4">
+            <a:extLst>
+              <a:ext uri="{FF2B5EF4-FFF2-40B4-BE49-F238E27FC236}">
+                <a16:creationId xmlns:a16="http://schemas.microsoft.com/office/drawing/2014/main" id="{CBCD6438-D121-3652-A3EB-E450DE415918}"/>
+              </a:ext>
+            </a:extLst>
+          </p:cNvPr>
+          <p:cNvSpPr txBox="1"/>
+          <p:nvPr/>
+        </p:nvSpPr>
+        <p:spPr>
+          <a:xfrm>
+            <a:off x="1556951" y="3027405"/>
+            <a:ext cx="655949" cy="369332"/>
+          </a:xfrm>
+          <a:prstGeom prst="rect">
+            <a:avLst/>
+          </a:prstGeom>
+          <a:noFill/>
+        </p:spPr>
+        <p:txBody>
+          <a:bodyPr wrap="none" rtlCol="0">
+            <a:spAutoFit/>
+          </a:bodyPr>
+          <a:lstStyle/>
+          <a:p>
+            <a:r>
+              <a:rPr lang="en-US" dirty="0"/>
+              <a:t>Then</a:t>
+            </a:r>
+          </a:p>
+        </p:txBody>
+      </p:sp>
+      <p:pic>
+        <p:nvPicPr>
+          <p:cNvPr id="6" name="Immagine 5">
+            <a:extLst>
+              <a:ext uri="{FF2B5EF4-FFF2-40B4-BE49-F238E27FC236}">
+                <a16:creationId xmlns:a16="http://schemas.microsoft.com/office/drawing/2014/main" id="{97383DA9-6B3B-68D2-8E87-816EF26A35AB}"/>
+              </a:ext>
+            </a:extLst>
+          </p:cNvPr>
+          <p:cNvPicPr>
+            <a:picLocks noChangeAspect="1"/>
+          </p:cNvPicPr>
+          <p:nvPr/>
+        </p:nvPicPr>
+        <p:blipFill>
+          <a:blip r:embed="rId3"/>
+          <a:stretch>
+            <a:fillRect/>
+          </a:stretch>
+        </p:blipFill>
+        <p:spPr>
+          <a:xfrm>
+            <a:off x="2616200" y="3457150"/>
+            <a:ext cx="3467100" cy="533400"/>
+          </a:xfrm>
+          <a:prstGeom prst="rect">
+            <a:avLst/>
+          </a:prstGeom>
+        </p:spPr>
+      </p:pic>
+      <p:sp>
+        <p:nvSpPr>
+          <p:cNvPr id="7" name="CasellaDiTesto 6">
+            <a:extLst>
+              <a:ext uri="{FF2B5EF4-FFF2-40B4-BE49-F238E27FC236}">
+                <a16:creationId xmlns:a16="http://schemas.microsoft.com/office/drawing/2014/main" id="{127E1A8F-AF75-A2AE-F2EC-9840F1B36C62}"/>
+              </a:ext>
+            </a:extLst>
+          </p:cNvPr>
+          <p:cNvSpPr txBox="1"/>
+          <p:nvPr/>
+        </p:nvSpPr>
+        <p:spPr>
+          <a:xfrm>
+            <a:off x="1556951" y="4245238"/>
+            <a:ext cx="8591734" cy="1754326"/>
+          </a:xfrm>
+          <a:prstGeom prst="rect">
+            <a:avLst/>
+          </a:prstGeom>
+          <a:noFill/>
+        </p:spPr>
+        <p:txBody>
+          <a:bodyPr wrap="square" rtlCol="0">
+            <a:spAutoFit/>
+          </a:bodyPr>
+          <a:lstStyle/>
+          <a:p>
+            <a:r>
+              <a:rPr lang="en-US" dirty="0"/>
+              <a:t>Where N is the number of photons.</a:t>
+            </a:r>
+          </a:p>
+          <a:p>
+            <a:endParaRPr lang="en-US" dirty="0"/>
+          </a:p>
+          <a:p>
+            <a:r>
+              <a:rPr lang="en-US" dirty="0"/>
+              <a:t>Please write down the following numbers: top area of the scatterer and absorber. Whit these number we get the efficiency.</a:t>
+            </a:r>
+          </a:p>
+          <a:p>
+            <a:endParaRPr lang="en-US" dirty="0"/>
+          </a:p>
+          <a:p>
+            <a:r>
+              <a:rPr lang="en-US" dirty="0"/>
+              <a:t>Of course, we need the detection logic (next slide) </a:t>
+            </a:r>
+          </a:p>
+        </p:txBody>
+      </p:sp>
+    </p:spTree>
+    <p:extLst>
+      <p:ext uri="{BB962C8B-B14F-4D97-AF65-F5344CB8AC3E}">
+        <p14:creationId xmlns:p14="http://schemas.microsoft.com/office/powerpoint/2010/main" val="20852986"/>
+      </p:ext>
+    </p:extLst>
+  </p:cSld>
+  <p:clrMapOvr>
+    <a:masterClrMapping/>
+  </p:clrMapOvr>
+</p:sld>
+</file>
+
+<file path=ppt/slides/slide4.xml><?xml version="1.0" encoding="utf-8"?>
+<p:sld xmlns:a="http://schemas.openxmlformats.org/drawingml/2006/main" xmlns:r="http://schemas.openxmlformats.org/officeDocument/2006/relationships" xmlns:p="http://schemas.openxmlformats.org/presentationml/2006/main">
+  <p:cSld>
+    <p:spTree>
+      <p:nvGrpSpPr>
+        <p:cNvPr id="1" name=""/>
+        <p:cNvGrpSpPr/>
+        <p:nvPr/>
+      </p:nvGrpSpPr>
+      <p:grpSpPr>
+        <a:xfrm>
+          <a:off x="0" y="0"/>
+          <a:ext cx="0" cy="0"/>
+          <a:chOff x="0" y="0"/>
+          <a:chExt cx="0" cy="0"/>
+        </a:xfrm>
+      </p:grpSpPr>
+      <p:sp>
+        <p:nvSpPr>
+          <p:cNvPr id="2" name="CasellaDiTesto 1">
+            <a:extLst>
+              <a:ext uri="{FF2B5EF4-FFF2-40B4-BE49-F238E27FC236}">
+                <a16:creationId xmlns:a16="http://schemas.microsoft.com/office/drawing/2014/main" id="{DD2A44B8-1A66-2D03-4D0D-E417A9E37F07}"/>
+              </a:ext>
+            </a:extLst>
+          </p:cNvPr>
+          <p:cNvSpPr txBox="1"/>
+          <p:nvPr/>
+        </p:nvSpPr>
+        <p:spPr>
+          <a:xfrm>
+            <a:off x="1520687" y="795130"/>
+            <a:ext cx="10225876" cy="2308324"/>
+          </a:xfrm>
+          <a:prstGeom prst="rect">
+            <a:avLst/>
+          </a:prstGeom>
+          <a:noFill/>
+        </p:spPr>
+        <p:txBody>
+          <a:bodyPr wrap="none" rtlCol="0">
+            <a:spAutoFit/>
+          </a:bodyPr>
+          <a:lstStyle/>
+          <a:p>
+            <a:r>
+              <a:rPr lang="en-US" dirty="0"/>
+              <a:t>Scatterer threshold: from … best case to … worse case</a:t>
+            </a:r>
+          </a:p>
+          <a:p>
+            <a:r>
+              <a:rPr lang="en-US" dirty="0"/>
+              <a:t>Absorber threshold: ...</a:t>
+            </a:r>
+          </a:p>
+          <a:p>
+            <a:r>
+              <a:rPr lang="en-US" dirty="0"/>
+              <a:t>(sorry I forgot the numbers…please, fill)</a:t>
+            </a:r>
+          </a:p>
+          <a:p>
+            <a:endParaRPr lang="en-US" dirty="0"/>
+          </a:p>
+          <a:p>
+            <a:r>
+              <a:rPr lang="en-US" dirty="0"/>
+              <a:t>Type a detection = 1 scatterer + 1 absorber</a:t>
+            </a:r>
+          </a:p>
+          <a:p>
+            <a:r>
+              <a:rPr lang="en-US" dirty="0"/>
+              <a:t>We can define type b, c type, </a:t>
+            </a:r>
+            <a:r>
+              <a:rPr lang="en-US" dirty="0" err="1"/>
+              <a:t>etc</a:t>
+            </a:r>
+            <a:r>
+              <a:rPr lang="en-US" dirty="0"/>
+              <a:t>…depending on the analysis chain. We will get </a:t>
+            </a:r>
+            <a:r>
+              <a:rPr lang="en-US" dirty="0" err="1"/>
+              <a:t>area_a</a:t>
+            </a:r>
+            <a:r>
+              <a:rPr lang="en-US" dirty="0"/>
+              <a:t>, area, c, </a:t>
+            </a:r>
+            <a:r>
+              <a:rPr lang="en-US" dirty="0" err="1"/>
+              <a:t>area_c</a:t>
+            </a:r>
+            <a:r>
+              <a:rPr lang="en-US" dirty="0"/>
+              <a:t> </a:t>
+            </a:r>
+            <a:r>
+              <a:rPr lang="en-US" dirty="0" err="1"/>
+              <a:t>etc</a:t>
+            </a:r>
+            <a:r>
+              <a:rPr lang="en-US" dirty="0"/>
+              <a:t>…</a:t>
+            </a:r>
+          </a:p>
+          <a:p>
+            <a:endParaRPr lang="en-US" dirty="0"/>
+          </a:p>
+          <a:p>
+            <a:endParaRPr lang="en-US" dirty="0"/>
+          </a:p>
+        </p:txBody>
+      </p:sp>
+    </p:spTree>
+    <p:extLst>
+      <p:ext uri="{BB962C8B-B14F-4D97-AF65-F5344CB8AC3E}">
+        <p14:creationId xmlns:p14="http://schemas.microsoft.com/office/powerpoint/2010/main" val="1710528536"/>
+      </p:ext>
+    </p:extLst>
+  </p:cSld>
+  <p:clrMapOvr>
+    <a:masterClrMapping/>
+  </p:clrMapOvr>
+</p:sld>
+</file>
+
 <file path=ppt/theme/theme1.xml><?xml version="1.0" encoding="utf-8"?>
 <a:theme xmlns:a="http://schemas.openxmlformats.org/drawingml/2006/main" name="Tema di Office">
   <a:themeElements>

</xml_diff>

<commit_message>
new polirized and unpolarized runs
</commit_message>
<xml_diff>
--- a/reports/2024-01-10/cusp_geant4_status_2024-01-10.pptx
+++ b/reports/2024-01-10/cusp_geant4_status_2024-01-10.pptx
@@ -264,7 +264,7 @@
           <a:p>
             <a:fld id="{ACD76B8E-B4D7-F447-B687-2804AAF21361}" type="datetimeFigureOut">
               <a:rPr lang="en-US" smtClean="0"/>
-              <a:t>1/11/24</a:t>
+              <a:t>1/17/24</a:t>
             </a:fld>
             <a:endParaRPr lang="en-US"/>
           </a:p>
@@ -464,7 +464,7 @@
           <a:p>
             <a:fld id="{ACD76B8E-B4D7-F447-B687-2804AAF21361}" type="datetimeFigureOut">
               <a:rPr lang="en-US" smtClean="0"/>
-              <a:t>1/11/24</a:t>
+              <a:t>1/17/24</a:t>
             </a:fld>
             <a:endParaRPr lang="en-US"/>
           </a:p>
@@ -674,7 +674,7 @@
           <a:p>
             <a:fld id="{ACD76B8E-B4D7-F447-B687-2804AAF21361}" type="datetimeFigureOut">
               <a:rPr lang="en-US" smtClean="0"/>
-              <a:t>1/11/24</a:t>
+              <a:t>1/17/24</a:t>
             </a:fld>
             <a:endParaRPr lang="en-US"/>
           </a:p>
@@ -874,7 +874,7 @@
           <a:p>
             <a:fld id="{ACD76B8E-B4D7-F447-B687-2804AAF21361}" type="datetimeFigureOut">
               <a:rPr lang="en-US" smtClean="0"/>
-              <a:t>1/11/24</a:t>
+              <a:t>1/17/24</a:t>
             </a:fld>
             <a:endParaRPr lang="en-US"/>
           </a:p>
@@ -1150,7 +1150,7 @@
           <a:p>
             <a:fld id="{ACD76B8E-B4D7-F447-B687-2804AAF21361}" type="datetimeFigureOut">
               <a:rPr lang="en-US" smtClean="0"/>
-              <a:t>1/11/24</a:t>
+              <a:t>1/17/24</a:t>
             </a:fld>
             <a:endParaRPr lang="en-US"/>
           </a:p>
@@ -1418,7 +1418,7 @@
           <a:p>
             <a:fld id="{ACD76B8E-B4D7-F447-B687-2804AAF21361}" type="datetimeFigureOut">
               <a:rPr lang="en-US" smtClean="0"/>
-              <a:t>1/11/24</a:t>
+              <a:t>1/17/24</a:t>
             </a:fld>
             <a:endParaRPr lang="en-US"/>
           </a:p>
@@ -1833,7 +1833,7 @@
           <a:p>
             <a:fld id="{ACD76B8E-B4D7-F447-B687-2804AAF21361}" type="datetimeFigureOut">
               <a:rPr lang="en-US" smtClean="0"/>
-              <a:t>1/11/24</a:t>
+              <a:t>1/17/24</a:t>
             </a:fld>
             <a:endParaRPr lang="en-US"/>
           </a:p>
@@ -1975,7 +1975,7 @@
           <a:p>
             <a:fld id="{ACD76B8E-B4D7-F447-B687-2804AAF21361}" type="datetimeFigureOut">
               <a:rPr lang="en-US" smtClean="0"/>
-              <a:t>1/11/24</a:t>
+              <a:t>1/17/24</a:t>
             </a:fld>
             <a:endParaRPr lang="en-US"/>
           </a:p>
@@ -2088,7 +2088,7 @@
           <a:p>
             <a:fld id="{ACD76B8E-B4D7-F447-B687-2804AAF21361}" type="datetimeFigureOut">
               <a:rPr lang="en-US" smtClean="0"/>
-              <a:t>1/11/24</a:t>
+              <a:t>1/17/24</a:t>
             </a:fld>
             <a:endParaRPr lang="en-US"/>
           </a:p>
@@ -2401,7 +2401,7 @@
           <a:p>
             <a:fld id="{ACD76B8E-B4D7-F447-B687-2804AAF21361}" type="datetimeFigureOut">
               <a:rPr lang="en-US" smtClean="0"/>
-              <a:t>1/11/24</a:t>
+              <a:t>1/17/24</a:t>
             </a:fld>
             <a:endParaRPr lang="en-US"/>
           </a:p>
@@ -2690,7 +2690,7 @@
           <a:p>
             <a:fld id="{ACD76B8E-B4D7-F447-B687-2804AAF21361}" type="datetimeFigureOut">
               <a:rPr lang="en-US" smtClean="0"/>
-              <a:t>1/11/24</a:t>
+              <a:t>1/17/24</a:t>
             </a:fld>
             <a:endParaRPr lang="en-US"/>
           </a:p>
@@ -2933,7 +2933,7 @@
           <a:p>
             <a:fld id="{ACD76B8E-B4D7-F447-B687-2804AAF21361}" type="datetimeFigureOut">
               <a:rPr lang="en-US" smtClean="0"/>
-              <a:t>1/11/24</a:t>
+              <a:t>1/17/24</a:t>
             </a:fld>
             <a:endParaRPr lang="en-US"/>
           </a:p>
@@ -3892,7 +3892,7 @@
         <p:spPr>
           <a:xfrm>
             <a:off x="1520687" y="795130"/>
-            <a:ext cx="10225876" cy="2308324"/>
+            <a:ext cx="8726556" cy="3785652"/>
           </a:xfrm>
           <a:prstGeom prst="rect">
             <a:avLst/>
@@ -3900,72 +3900,365 @@
           <a:noFill/>
         </p:spPr>
         <p:txBody>
-          <a:bodyPr wrap="none" rtlCol="0">
+          <a:bodyPr wrap="square" rtlCol="0">
             <a:spAutoFit/>
           </a:bodyPr>
           <a:lstStyle/>
           <a:p>
-            <a:r>
-              <a:rPr lang="en-US" dirty="0"/>
-              <a:t>Scatterer threshold: from … best case to … worse case</a:t>
-            </a:r>
-          </a:p>
-          <a:p>
-            <a:r>
-              <a:rPr lang="en-US" dirty="0"/>
-              <a:t>Absorber threshold: ...</a:t>
-            </a:r>
-          </a:p>
-          <a:p>
-            <a:r>
-              <a:rPr lang="en-US" dirty="0"/>
-              <a:t>(sorry I forgot the numbers…please, fill)</a:t>
+            <a:pPr algn="ctr"/>
+            <a:r>
+              <a:rPr lang="en-US" sz="2400" b="1" dirty="0"/>
+              <a:t>Detection logic</a:t>
             </a:r>
           </a:p>
           <a:p>
             <a:endParaRPr lang="en-US" dirty="0"/>
           </a:p>
           <a:p>
-            <a:r>
-              <a:rPr lang="en-US" dirty="0"/>
+            <a:endParaRPr lang="it-IT" dirty="0">
+              <a:solidFill>
+                <a:srgbClr val="222222"/>
+              </a:solidFill>
+              <a:latin typeface="Calibri" panose="020F0502020204030204" pitchFamily="34" charset="0"/>
+              <a:cs typeface="Calibri" panose="020F0502020204030204" pitchFamily="34" charset="0"/>
+            </a:endParaRPr>
+          </a:p>
+          <a:p>
+            <a:r>
+              <a:rPr lang="it-IT" b="1" i="0" dirty="0" err="1">
+                <a:solidFill>
+                  <a:srgbClr val="222222"/>
+                </a:solidFill>
+                <a:effectLst/>
+                <a:latin typeface="Calibri" panose="020F0502020204030204" pitchFamily="34" charset="0"/>
+                <a:cs typeface="Calibri" panose="020F0502020204030204" pitchFamily="34" charset="0"/>
+              </a:rPr>
+              <a:t>Geometric</a:t>
+            </a:r>
+            <a:r>
+              <a:rPr lang="it-IT" b="1" i="0" dirty="0">
+                <a:solidFill>
+                  <a:srgbClr val="222222"/>
+                </a:solidFill>
+                <a:effectLst/>
+                <a:latin typeface="Calibri" panose="020F0502020204030204" pitchFamily="34" charset="0"/>
+                <a:cs typeface="Calibri" panose="020F0502020204030204" pitchFamily="34" charset="0"/>
+              </a:rPr>
+              <a:t> area of </a:t>
+            </a:r>
+            <a:r>
+              <a:rPr lang="it-IT" b="1" i="0" dirty="0" err="1">
+                <a:solidFill>
+                  <a:srgbClr val="222222"/>
+                </a:solidFill>
+                <a:effectLst/>
+                <a:latin typeface="Calibri" panose="020F0502020204030204" pitchFamily="34" charset="0"/>
+                <a:cs typeface="Calibri" panose="020F0502020204030204" pitchFamily="34" charset="0"/>
+              </a:rPr>
+              <a:t>scatterers</a:t>
+            </a:r>
+            <a:r>
+              <a:rPr lang="it-IT" b="1" i="0" dirty="0">
+                <a:solidFill>
+                  <a:srgbClr val="222222"/>
+                </a:solidFill>
+                <a:effectLst/>
+                <a:latin typeface="Calibri" panose="020F0502020204030204" pitchFamily="34" charset="0"/>
+                <a:cs typeface="Calibri" panose="020F0502020204030204" pitchFamily="34" charset="0"/>
+              </a:rPr>
+              <a:t> </a:t>
+            </a:r>
+            <a:r>
+              <a:rPr lang="it-IT" b="0" i="0" dirty="0">
+                <a:solidFill>
+                  <a:srgbClr val="222222"/>
+                </a:solidFill>
+                <a:effectLst/>
+                <a:latin typeface="Calibri" panose="020F0502020204030204" pitchFamily="34" charset="0"/>
+                <a:cs typeface="Calibri" panose="020F0502020204030204" pitchFamily="34" charset="0"/>
+              </a:rPr>
+              <a:t>:12.115 cm^2</a:t>
+            </a:r>
+          </a:p>
+          <a:p>
+            <a:endParaRPr lang="it-IT" dirty="0">
+              <a:solidFill>
+                <a:srgbClr val="222222"/>
+              </a:solidFill>
+              <a:latin typeface="Calibri" panose="020F0502020204030204" pitchFamily="34" charset="0"/>
+              <a:cs typeface="Calibri" panose="020F0502020204030204" pitchFamily="34" charset="0"/>
+            </a:endParaRPr>
+          </a:p>
+          <a:p>
+            <a:r>
+              <a:rPr lang="it-IT" b="1" i="0" dirty="0" err="1">
+                <a:solidFill>
+                  <a:srgbClr val="222222"/>
+                </a:solidFill>
+                <a:effectLst/>
+                <a:latin typeface="Calibri" panose="020F0502020204030204" pitchFamily="34" charset="0"/>
+                <a:cs typeface="Calibri" panose="020F0502020204030204" pitchFamily="34" charset="0"/>
+              </a:rPr>
+              <a:t>Scatterers</a:t>
+            </a:r>
+            <a:r>
+              <a:rPr lang="it-IT" b="1" i="0" dirty="0">
+                <a:solidFill>
+                  <a:srgbClr val="222222"/>
+                </a:solidFill>
+                <a:effectLst/>
+                <a:latin typeface="Calibri" panose="020F0502020204030204" pitchFamily="34" charset="0"/>
+                <a:cs typeface="Calibri" panose="020F0502020204030204" pitchFamily="34" charset="0"/>
+              </a:rPr>
+              <a:t> energy </a:t>
+            </a:r>
+            <a:r>
+              <a:rPr lang="it-IT" b="1" i="0" dirty="0" err="1">
+                <a:solidFill>
+                  <a:srgbClr val="222222"/>
+                </a:solidFill>
+                <a:effectLst/>
+                <a:latin typeface="Calibri" panose="020F0502020204030204" pitchFamily="34" charset="0"/>
+                <a:cs typeface="Calibri" panose="020F0502020204030204" pitchFamily="34" charset="0"/>
+              </a:rPr>
+              <a:t>deposit</a:t>
+            </a:r>
+            <a:r>
+              <a:rPr lang="it-IT" b="1" i="0" dirty="0">
+                <a:solidFill>
+                  <a:srgbClr val="222222"/>
+                </a:solidFill>
+                <a:effectLst/>
+                <a:latin typeface="Calibri" panose="020F0502020204030204" pitchFamily="34" charset="0"/>
+                <a:cs typeface="Calibri" panose="020F0502020204030204" pitchFamily="34" charset="0"/>
+              </a:rPr>
+              <a:t> </a:t>
+            </a:r>
+            <a:r>
+              <a:rPr lang="it-IT" b="1" i="0" dirty="0" err="1">
+                <a:solidFill>
+                  <a:srgbClr val="222222"/>
+                </a:solidFill>
+                <a:effectLst/>
+                <a:latin typeface="Calibri" panose="020F0502020204030204" pitchFamily="34" charset="0"/>
+                <a:cs typeface="Calibri" panose="020F0502020204030204" pitchFamily="34" charset="0"/>
+              </a:rPr>
+              <a:t>threshold</a:t>
+            </a:r>
+            <a:r>
+              <a:rPr lang="it-IT" b="1" i="0" dirty="0">
+                <a:solidFill>
+                  <a:srgbClr val="222222"/>
+                </a:solidFill>
+                <a:effectLst/>
+                <a:latin typeface="Calibri" panose="020F0502020204030204" pitchFamily="34" charset="0"/>
+                <a:cs typeface="Calibri" panose="020F0502020204030204" pitchFamily="34" charset="0"/>
+              </a:rPr>
+              <a:t> to test</a:t>
+            </a:r>
+            <a:r>
+              <a:rPr lang="it-IT" b="0" i="0" dirty="0">
+                <a:solidFill>
+                  <a:srgbClr val="222222"/>
+                </a:solidFill>
+                <a:effectLst/>
+                <a:latin typeface="Calibri" panose="020F0502020204030204" pitchFamily="34" charset="0"/>
+                <a:cs typeface="Calibri" panose="020F0502020204030204" pitchFamily="34" charset="0"/>
+              </a:rPr>
+              <a:t>: </a:t>
+            </a:r>
+            <a:r>
+              <a:rPr lang="it-IT" b="0" i="0" dirty="0" err="1">
+                <a:solidFill>
+                  <a:srgbClr val="222222"/>
+                </a:solidFill>
+                <a:effectLst/>
+                <a:latin typeface="Calibri" panose="020F0502020204030204" pitchFamily="34" charset="0"/>
+                <a:cs typeface="Calibri" panose="020F0502020204030204" pitchFamily="34" charset="0"/>
+              </a:rPr>
+              <a:t>could</a:t>
+            </a:r>
+            <a:r>
+              <a:rPr lang="it-IT" b="0" i="0" dirty="0">
+                <a:solidFill>
+                  <a:srgbClr val="222222"/>
+                </a:solidFill>
+                <a:effectLst/>
+                <a:latin typeface="Calibri" panose="020F0502020204030204" pitchFamily="34" charset="0"/>
+                <a:cs typeface="Calibri" panose="020F0502020204030204" pitchFamily="34" charset="0"/>
+              </a:rPr>
+              <a:t> be 0 </a:t>
+            </a:r>
+            <a:r>
+              <a:rPr lang="it-IT" b="0" i="0" dirty="0" err="1">
+                <a:solidFill>
+                  <a:srgbClr val="222222"/>
+                </a:solidFill>
+                <a:effectLst/>
+                <a:latin typeface="Calibri" panose="020F0502020204030204" pitchFamily="34" charset="0"/>
+                <a:cs typeface="Calibri" panose="020F0502020204030204" pitchFamily="34" charset="0"/>
+              </a:rPr>
+              <a:t>keV</a:t>
+            </a:r>
+            <a:r>
+              <a:rPr lang="it-IT" b="0" i="0" dirty="0">
+                <a:solidFill>
+                  <a:srgbClr val="222222"/>
+                </a:solidFill>
+                <a:effectLst/>
+                <a:latin typeface="Calibri" panose="020F0502020204030204" pitchFamily="34" charset="0"/>
+                <a:cs typeface="Calibri" panose="020F0502020204030204" pitchFamily="34" charset="0"/>
+              </a:rPr>
+              <a:t>, 0.25keV, 0.5 </a:t>
+            </a:r>
+            <a:r>
+              <a:rPr lang="it-IT" b="0" i="0" dirty="0" err="1">
+                <a:solidFill>
+                  <a:srgbClr val="222222"/>
+                </a:solidFill>
+                <a:effectLst/>
+                <a:latin typeface="Calibri" panose="020F0502020204030204" pitchFamily="34" charset="0"/>
+                <a:cs typeface="Calibri" panose="020F0502020204030204" pitchFamily="34" charset="0"/>
+              </a:rPr>
+              <a:t>keV</a:t>
+            </a:r>
+            <a:r>
+              <a:rPr lang="it-IT" b="0" i="0" dirty="0">
+                <a:solidFill>
+                  <a:srgbClr val="222222"/>
+                </a:solidFill>
+                <a:effectLst/>
+                <a:latin typeface="Calibri" panose="020F0502020204030204" pitchFamily="34" charset="0"/>
+                <a:cs typeface="Calibri" panose="020F0502020204030204" pitchFamily="34" charset="0"/>
+              </a:rPr>
+              <a:t>, 0.75 </a:t>
+            </a:r>
+            <a:r>
+              <a:rPr lang="it-IT" b="0" i="0" dirty="0" err="1">
+                <a:solidFill>
+                  <a:srgbClr val="222222"/>
+                </a:solidFill>
+                <a:effectLst/>
+                <a:latin typeface="Calibri" panose="020F0502020204030204" pitchFamily="34" charset="0"/>
+                <a:cs typeface="Calibri" panose="020F0502020204030204" pitchFamily="34" charset="0"/>
+              </a:rPr>
+              <a:t>keV</a:t>
+            </a:r>
+            <a:r>
+              <a:rPr lang="it-IT" b="0" i="0" dirty="0">
+                <a:solidFill>
+                  <a:srgbClr val="222222"/>
+                </a:solidFill>
+                <a:effectLst/>
+                <a:latin typeface="Calibri" panose="020F0502020204030204" pitchFamily="34" charset="0"/>
+                <a:cs typeface="Calibri" panose="020F0502020204030204" pitchFamily="34" charset="0"/>
+              </a:rPr>
+              <a:t>, 1 </a:t>
+            </a:r>
+            <a:r>
+              <a:rPr lang="it-IT" b="0" i="0" dirty="0" err="1">
+                <a:solidFill>
+                  <a:srgbClr val="222222"/>
+                </a:solidFill>
+                <a:effectLst/>
+                <a:latin typeface="Calibri" panose="020F0502020204030204" pitchFamily="34" charset="0"/>
+                <a:cs typeface="Calibri" panose="020F0502020204030204" pitchFamily="34" charset="0"/>
+              </a:rPr>
+              <a:t>keV</a:t>
+            </a:r>
+            <a:r>
+              <a:rPr lang="it-IT" b="0" i="0" dirty="0">
+                <a:solidFill>
+                  <a:srgbClr val="222222"/>
+                </a:solidFill>
+                <a:effectLst/>
+                <a:latin typeface="Calibri" panose="020F0502020204030204" pitchFamily="34" charset="0"/>
+                <a:cs typeface="Calibri" panose="020F0502020204030204" pitchFamily="34" charset="0"/>
+              </a:rPr>
+              <a:t>.</a:t>
+            </a:r>
+            <a:endParaRPr lang="en-US" dirty="0">
+              <a:latin typeface="Calibri" panose="020F0502020204030204" pitchFamily="34" charset="0"/>
+              <a:cs typeface="Calibri" panose="020F0502020204030204" pitchFamily="34" charset="0"/>
+            </a:endParaRPr>
+          </a:p>
+          <a:p>
+            <a:endParaRPr lang="en-US" dirty="0">
+              <a:latin typeface="Calibri" panose="020F0502020204030204" pitchFamily="34" charset="0"/>
+              <a:cs typeface="Calibri" panose="020F0502020204030204" pitchFamily="34" charset="0"/>
+            </a:endParaRPr>
+          </a:p>
+          <a:p>
+            <a:r>
+              <a:rPr lang="en-US" b="1" dirty="0">
+                <a:latin typeface="Calibri" panose="020F0502020204030204" pitchFamily="34" charset="0"/>
+                <a:cs typeface="Calibri" panose="020F0502020204030204" pitchFamily="34" charset="0"/>
+              </a:rPr>
               <a:t>Type a detection = 1 scatterer + 1 absorber</a:t>
             </a:r>
           </a:p>
           <a:p>
             <a:r>
-              <a:rPr lang="en-US" dirty="0"/>
+              <a:rPr lang="en-US" dirty="0">
+                <a:latin typeface="Calibri" panose="020F0502020204030204" pitchFamily="34" charset="0"/>
+                <a:cs typeface="Calibri" panose="020F0502020204030204" pitchFamily="34" charset="0"/>
+              </a:rPr>
               <a:t>We can define type b, c type, </a:t>
             </a:r>
             <a:r>
-              <a:rPr lang="en-US" dirty="0" err="1"/>
+              <a:rPr lang="en-US" dirty="0" err="1">
+                <a:latin typeface="Calibri" panose="020F0502020204030204" pitchFamily="34" charset="0"/>
+                <a:cs typeface="Calibri" panose="020F0502020204030204" pitchFamily="34" charset="0"/>
+              </a:rPr>
               <a:t>etc</a:t>
             </a:r>
             <a:r>
-              <a:rPr lang="en-US" dirty="0"/>
+              <a:rPr lang="en-US" dirty="0">
+                <a:latin typeface="Calibri" panose="020F0502020204030204" pitchFamily="34" charset="0"/>
+                <a:cs typeface="Calibri" panose="020F0502020204030204" pitchFamily="34" charset="0"/>
+              </a:rPr>
               <a:t>…depending on the analysis chain. We will get </a:t>
             </a:r>
             <a:r>
-              <a:rPr lang="en-US" dirty="0" err="1"/>
+              <a:rPr lang="en-US" dirty="0" err="1">
+                <a:latin typeface="Calibri" panose="020F0502020204030204" pitchFamily="34" charset="0"/>
+                <a:cs typeface="Calibri" panose="020F0502020204030204" pitchFamily="34" charset="0"/>
+              </a:rPr>
               <a:t>area_a</a:t>
             </a:r>
             <a:r>
-              <a:rPr lang="en-US" dirty="0"/>
+              <a:rPr lang="en-US" dirty="0">
+                <a:latin typeface="Calibri" panose="020F0502020204030204" pitchFamily="34" charset="0"/>
+                <a:cs typeface="Calibri" panose="020F0502020204030204" pitchFamily="34" charset="0"/>
+              </a:rPr>
               <a:t>, area, c, </a:t>
             </a:r>
             <a:r>
-              <a:rPr lang="en-US" dirty="0" err="1"/>
+              <a:rPr lang="en-US" dirty="0" err="1">
+                <a:latin typeface="Calibri" panose="020F0502020204030204" pitchFamily="34" charset="0"/>
+                <a:cs typeface="Calibri" panose="020F0502020204030204" pitchFamily="34" charset="0"/>
+              </a:rPr>
               <a:t>area_c</a:t>
             </a:r>
             <a:r>
-              <a:rPr lang="en-US" dirty="0"/>
+              <a:rPr lang="en-US" dirty="0">
+                <a:latin typeface="Calibri" panose="020F0502020204030204" pitchFamily="34" charset="0"/>
+                <a:cs typeface="Calibri" panose="020F0502020204030204" pitchFamily="34" charset="0"/>
+              </a:rPr>
               <a:t> </a:t>
             </a:r>
             <a:r>
-              <a:rPr lang="en-US" dirty="0" err="1"/>
+              <a:rPr lang="en-US" dirty="0" err="1">
+                <a:latin typeface="Calibri" panose="020F0502020204030204" pitchFamily="34" charset="0"/>
+                <a:cs typeface="Calibri" panose="020F0502020204030204" pitchFamily="34" charset="0"/>
+              </a:rPr>
               <a:t>etc</a:t>
             </a:r>
             <a:r>
-              <a:rPr lang="en-US" dirty="0"/>
+              <a:rPr lang="en-US" dirty="0">
+                <a:latin typeface="Calibri" panose="020F0502020204030204" pitchFamily="34" charset="0"/>
+                <a:cs typeface="Calibri" panose="020F0502020204030204" pitchFamily="34" charset="0"/>
+              </a:rPr>
               <a:t>…</a:t>
             </a:r>
           </a:p>

</xml_diff>